<commit_message>
aggiornate con PUT actuator eliminato
</commit_message>
<xml_diff>
--- a/Materiale Extra/Presentazione del progetto.pptx
+++ b/Materiale Extra/Presentazione del progetto.pptx
@@ -7,8 +7,8 @@
   <p:sldIdLst>
     <p:sldId id="256" r:id="rId2"/>
     <p:sldId id="257" r:id="rId3"/>
-    <p:sldId id="260" r:id="rId4"/>
-    <p:sldId id="259" r:id="rId5"/>
+    <p:sldId id="259" r:id="rId4"/>
+    <p:sldId id="260" r:id="rId5"/>
     <p:sldId id="261" r:id="rId6"/>
     <p:sldId id="275" r:id="rId7"/>
     <p:sldId id="276" r:id="rId8"/>
@@ -865,7 +865,7 @@
           <a:p>
             <a:fld id="{C1775FA8-FEF5-4078-A009-D10F19796D95}" type="datetimeFigureOut">
               <a:rPr lang="it-IT" smtClean="0"/>
-              <a:t>31/05/2023</a:t>
+              <a:t>05/06/2023</a:t>
             </a:fld>
             <a:endParaRPr lang="it-IT"/>
           </a:p>
@@ -1116,7 +1116,7 @@
           <a:p>
             <a:fld id="{C1775FA8-FEF5-4078-A009-D10F19796D95}" type="datetimeFigureOut">
               <a:rPr lang="it-IT" smtClean="0"/>
-              <a:t>31/05/2023</a:t>
+              <a:t>05/06/2023</a:t>
             </a:fld>
             <a:endParaRPr lang="it-IT"/>
           </a:p>
@@ -1430,7 +1430,7 @@
           <a:p>
             <a:fld id="{C1775FA8-FEF5-4078-A009-D10F19796D95}" type="datetimeFigureOut">
               <a:rPr lang="it-IT" smtClean="0"/>
-              <a:t>31/05/2023</a:t>
+              <a:t>05/06/2023</a:t>
             </a:fld>
             <a:endParaRPr lang="it-IT"/>
           </a:p>
@@ -1771,7 +1771,7 @@
           <a:p>
             <a:fld id="{C1775FA8-FEF5-4078-A009-D10F19796D95}" type="datetimeFigureOut">
               <a:rPr lang="it-IT" smtClean="0"/>
-              <a:t>31/05/2023</a:t>
+              <a:t>05/06/2023</a:t>
             </a:fld>
             <a:endParaRPr lang="it-IT"/>
           </a:p>
@@ -2085,7 +2085,7 @@
           <a:p>
             <a:fld id="{C1775FA8-FEF5-4078-A009-D10F19796D95}" type="datetimeFigureOut">
               <a:rPr lang="it-IT" smtClean="0"/>
-              <a:t>31/05/2023</a:t>
+              <a:t>05/06/2023</a:t>
             </a:fld>
             <a:endParaRPr lang="it-IT"/>
           </a:p>
@@ -2478,7 +2478,7 @@
           <a:p>
             <a:fld id="{C1775FA8-FEF5-4078-A009-D10F19796D95}" type="datetimeFigureOut">
               <a:rPr lang="it-IT" smtClean="0"/>
-              <a:t>31/05/2023</a:t>
+              <a:t>05/06/2023</a:t>
             </a:fld>
             <a:endParaRPr lang="it-IT"/>
           </a:p>
@@ -2648,7 +2648,7 @@
           <a:p>
             <a:fld id="{C1775FA8-FEF5-4078-A009-D10F19796D95}" type="datetimeFigureOut">
               <a:rPr lang="it-IT" smtClean="0"/>
-              <a:t>31/05/2023</a:t>
+              <a:t>05/06/2023</a:t>
             </a:fld>
             <a:endParaRPr lang="it-IT"/>
           </a:p>
@@ -2828,7 +2828,7 @@
           <a:p>
             <a:fld id="{C1775FA8-FEF5-4078-A009-D10F19796D95}" type="datetimeFigureOut">
               <a:rPr lang="it-IT" smtClean="0"/>
-              <a:t>31/05/2023</a:t>
+              <a:t>05/06/2023</a:t>
             </a:fld>
             <a:endParaRPr lang="it-IT"/>
           </a:p>
@@ -3004,7 +3004,7 @@
           <a:p>
             <a:fld id="{C1775FA8-FEF5-4078-A009-D10F19796D95}" type="datetimeFigureOut">
               <a:rPr lang="it-IT" smtClean="0"/>
-              <a:t>31/05/2023</a:t>
+              <a:t>05/06/2023</a:t>
             </a:fld>
             <a:endParaRPr lang="it-IT"/>
           </a:p>
@@ -3251,7 +3251,7 @@
           <a:p>
             <a:fld id="{C1775FA8-FEF5-4078-A009-D10F19796D95}" type="datetimeFigureOut">
               <a:rPr lang="it-IT" smtClean="0"/>
-              <a:t>31/05/2023</a:t>
+              <a:t>05/06/2023</a:t>
             </a:fld>
             <a:endParaRPr lang="it-IT"/>
           </a:p>
@@ -3483,7 +3483,7 @@
           <a:p>
             <a:fld id="{C1775FA8-FEF5-4078-A009-D10F19796D95}" type="datetimeFigureOut">
               <a:rPr lang="it-IT" smtClean="0"/>
-              <a:t>31/05/2023</a:t>
+              <a:t>05/06/2023</a:t>
             </a:fld>
             <a:endParaRPr lang="it-IT"/>
           </a:p>
@@ -3857,7 +3857,7 @@
           <a:p>
             <a:fld id="{C1775FA8-FEF5-4078-A009-D10F19796D95}" type="datetimeFigureOut">
               <a:rPr lang="it-IT" smtClean="0"/>
-              <a:t>31/05/2023</a:t>
+              <a:t>05/06/2023</a:t>
             </a:fld>
             <a:endParaRPr lang="it-IT"/>
           </a:p>
@@ -3980,7 +3980,7 @@
           <a:p>
             <a:fld id="{C1775FA8-FEF5-4078-A009-D10F19796D95}" type="datetimeFigureOut">
               <a:rPr lang="it-IT" smtClean="0"/>
-              <a:t>31/05/2023</a:t>
+              <a:t>05/06/2023</a:t>
             </a:fld>
             <a:endParaRPr lang="it-IT"/>
           </a:p>
@@ -4075,7 +4075,7 @@
           <a:p>
             <a:fld id="{C1775FA8-FEF5-4078-A009-D10F19796D95}" type="datetimeFigureOut">
               <a:rPr lang="it-IT" smtClean="0"/>
-              <a:t>31/05/2023</a:t>
+              <a:t>05/06/2023</a:t>
             </a:fld>
             <a:endParaRPr lang="it-IT"/>
           </a:p>
@@ -4330,7 +4330,7 @@
           <a:p>
             <a:fld id="{C1775FA8-FEF5-4078-A009-D10F19796D95}" type="datetimeFigureOut">
               <a:rPr lang="it-IT" smtClean="0"/>
-              <a:t>31/05/2023</a:t>
+              <a:t>05/06/2023</a:t>
             </a:fld>
             <a:endParaRPr lang="it-IT"/>
           </a:p>
@@ -4593,7 +4593,7 @@
           <a:p>
             <a:fld id="{C1775FA8-FEF5-4078-A009-D10F19796D95}" type="datetimeFigureOut">
               <a:rPr lang="it-IT" smtClean="0"/>
-              <a:t>31/05/2023</a:t>
+              <a:t>05/06/2023</a:t>
             </a:fld>
             <a:endParaRPr lang="it-IT"/>
           </a:p>
@@ -5336,7 +5336,7 @@
           <a:p>
             <a:fld id="{C1775FA8-FEF5-4078-A009-D10F19796D95}" type="datetimeFigureOut">
               <a:rPr lang="it-IT" smtClean="0"/>
-              <a:t>31/05/2023</a:t>
+              <a:t>05/06/2023</a:t>
             </a:fld>
             <a:endParaRPr lang="it-IT"/>
           </a:p>
@@ -22027,12 +22027,7 @@
             <p:ph type="title"/>
           </p:nvPr>
         </p:nvSpPr>
-        <p:spPr>
-          <a:xfrm>
-            <a:off x="658673" y="422987"/>
-            <a:ext cx="8596668" cy="1320800"/>
-          </a:xfrm>
-        </p:spPr>
+        <p:spPr/>
         <p:txBody>
           <a:bodyPr/>
           <a:lstStyle/>
@@ -22048,22 +22043,17 @@
             </a:r>
             <a:r>
               <a:rPr lang="it-IT" dirty="0"/>
-              <a:t> - </a:t>
-            </a:r>
-            <a:r>
-              <a:rPr lang="it-IT" dirty="0" err="1"/>
-              <a:t>Proposal</a:t>
-            </a:r>
-            <a:endParaRPr lang="it-IT" dirty="0"/>
+              <a:t> - Update </a:t>
+            </a:r>
           </a:p>
         </p:txBody>
       </p:sp>
       <p:pic>
         <p:nvPicPr>
-          <p:cNvPr id="4" name="Picture 3">
+          <p:cNvPr id="5" name="Picture 4">
             <a:extLst>
               <a:ext uri="{FF2B5EF4-FFF2-40B4-BE49-F238E27FC236}">
-                <a16:creationId xmlns:a16="http://schemas.microsoft.com/office/drawing/2014/main" id="{A937875E-F5DB-0F12-6BCC-55C83DCBA47A}"/>
+                <a16:creationId xmlns:a16="http://schemas.microsoft.com/office/drawing/2014/main" id="{013A3A9F-F569-4F5A-9E4D-7057E321900A}"/>
               </a:ext>
             </a:extLst>
           </p:cNvPr>
@@ -22072,25 +22062,42 @@
           </p:cNvPicPr>
           <p:nvPr/>
         </p:nvPicPr>
-        <p:blipFill rotWithShape="1">
-          <a:blip r:embed="rId2"/>
-          <a:srcRect l="1668" t="1203" b="523"/>
-          <a:stretch/>
+        <p:blipFill>
+          <a:blip r:embed="rId2">
+            <a:extLst>
+              <a:ext uri="{28A0092B-C50C-407E-A947-70E740481C1C}">
+                <a14:useLocalDpi xmlns:a14="http://schemas.microsoft.com/office/drawing/2010/main" val="0"/>
+              </a:ext>
+            </a:extLst>
+          </a:blip>
+          <a:stretch>
+            <a:fillRect/>
+          </a:stretch>
         </p:blipFill>
         <p:spPr>
           <a:xfrm>
-            <a:off x="533570" y="1307323"/>
-            <a:ext cx="8596668" cy="4869543"/>
+            <a:off x="613237" y="1582016"/>
+            <a:ext cx="8001846" cy="4513983"/>
           </a:xfrm>
           <a:prstGeom prst="rect">
             <a:avLst/>
           </a:prstGeom>
+          <a:ln>
+            <a:noFill/>
+          </a:ln>
+          <a:effectLst>
+            <a:outerShdw blurRad="292100" dist="139700" dir="2700000" algn="tl" rotWithShape="0">
+              <a:srgbClr val="333333">
+                <a:alpha val="65000"/>
+              </a:srgbClr>
+            </a:outerShdw>
+          </a:effectLst>
         </p:spPr>
       </p:pic>
     </p:spTree>
     <p:extLst>
       <p:ext uri="{BB962C8B-B14F-4D97-AF65-F5344CB8AC3E}">
-        <p14:creationId xmlns:p14="http://schemas.microsoft.com/office/powerpoint/2010/main" val="2139544822"/>
+        <p14:creationId xmlns:p14="http://schemas.microsoft.com/office/powerpoint/2010/main" val="3302964220"/>
       </p:ext>
     </p:extLst>
   </p:cSld>
@@ -24481,7 +24488,12 @@
             <p:ph type="title"/>
           </p:nvPr>
         </p:nvSpPr>
-        <p:spPr/>
+        <p:spPr>
+          <a:xfrm>
+            <a:off x="658673" y="422987"/>
+            <a:ext cx="8596668" cy="1320800"/>
+          </a:xfrm>
+        </p:spPr>
         <p:txBody>
           <a:bodyPr/>
           <a:lstStyle/>
@@ -24497,17 +24509,22 @@
             </a:r>
             <a:r>
               <a:rPr lang="it-IT" dirty="0"/>
-              <a:t> - Update </a:t>
-            </a:r>
+              <a:t> - </a:t>
+            </a:r>
+            <a:r>
+              <a:rPr lang="it-IT" dirty="0" err="1"/>
+              <a:t>Proposal</a:t>
+            </a:r>
+            <a:endParaRPr lang="it-IT" dirty="0"/>
           </a:p>
         </p:txBody>
       </p:sp>
       <p:pic>
         <p:nvPicPr>
-          <p:cNvPr id="5" name="Picture 4">
+          <p:cNvPr id="4" name="Picture 3">
             <a:extLst>
               <a:ext uri="{FF2B5EF4-FFF2-40B4-BE49-F238E27FC236}">
-                <a16:creationId xmlns:a16="http://schemas.microsoft.com/office/drawing/2014/main" id="{013A3A9F-F569-4F5A-9E4D-7057E321900A}"/>
+                <a16:creationId xmlns:a16="http://schemas.microsoft.com/office/drawing/2014/main" id="{A937875E-F5DB-0F12-6BCC-55C83DCBA47A}"/>
               </a:ext>
             </a:extLst>
           </p:cNvPr>
@@ -24516,42 +24533,25 @@
           </p:cNvPicPr>
           <p:nvPr/>
         </p:nvPicPr>
-        <p:blipFill>
-          <a:blip r:embed="rId2">
-            <a:extLst>
-              <a:ext uri="{28A0092B-C50C-407E-A947-70E740481C1C}">
-                <a14:useLocalDpi xmlns:a14="http://schemas.microsoft.com/office/drawing/2010/main" val="0"/>
-              </a:ext>
-            </a:extLst>
-          </a:blip>
-          <a:stretch>
-            <a:fillRect/>
-          </a:stretch>
+        <p:blipFill rotWithShape="1">
+          <a:blip r:embed="rId2"/>
+          <a:srcRect l="1668" t="1203" b="523"/>
+          <a:stretch/>
         </p:blipFill>
         <p:spPr>
           <a:xfrm>
-            <a:off x="613237" y="1582016"/>
-            <a:ext cx="8001846" cy="4513983"/>
+            <a:off x="533570" y="1307323"/>
+            <a:ext cx="8596668" cy="4869543"/>
           </a:xfrm>
           <a:prstGeom prst="rect">
             <a:avLst/>
           </a:prstGeom>
-          <a:ln>
-            <a:noFill/>
-          </a:ln>
-          <a:effectLst>
-            <a:outerShdw blurRad="292100" dist="139700" dir="2700000" algn="tl" rotWithShape="0">
-              <a:srgbClr val="333333">
-                <a:alpha val="65000"/>
-              </a:srgbClr>
-            </a:outerShdw>
-          </a:effectLst>
         </p:spPr>
       </p:pic>
     </p:spTree>
     <p:extLst>
       <p:ext uri="{BB962C8B-B14F-4D97-AF65-F5344CB8AC3E}">
-        <p14:creationId xmlns:p14="http://schemas.microsoft.com/office/powerpoint/2010/main" val="3302964220"/>
+        <p14:creationId xmlns:p14="http://schemas.microsoft.com/office/powerpoint/2010/main" val="2139544822"/>
       </p:ext>
     </p:extLst>
   </p:cSld>
@@ -28433,8 +28433,8 @@
         </p:nvCxnSpPr>
         <p:spPr>
           <a:xfrm flipV="1">
-            <a:off x="4446495" y="2387873"/>
-            <a:ext cx="2130251" cy="1410921"/>
+            <a:off x="4446495" y="2670839"/>
+            <a:ext cx="2141829" cy="1127955"/>
           </a:xfrm>
           <a:prstGeom prst="straightConnector1">
             <a:avLst/>
@@ -28472,7 +28472,7 @@
         </p:nvSpPr>
         <p:spPr>
           <a:xfrm>
-            <a:off x="6576746" y="2203207"/>
+            <a:off x="6588324" y="2486173"/>
             <a:ext cx="1211233" cy="369332"/>
           </a:xfrm>
           <a:prstGeom prst="rect">
@@ -28801,7 +28801,7 @@
         </p:nvSpPr>
         <p:spPr>
           <a:xfrm>
-            <a:off x="8152433" y="2233984"/>
+            <a:off x="8071751" y="2233982"/>
             <a:ext cx="1124311" cy="307777"/>
           </a:xfrm>
           <a:prstGeom prst="rect">
@@ -28891,7 +28891,7 @@
         </p:nvSpPr>
         <p:spPr>
           <a:xfrm>
-            <a:off x="8355251" y="2686198"/>
+            <a:off x="8294118" y="2686197"/>
             <a:ext cx="718674" cy="307777"/>
           </a:xfrm>
           <a:prstGeom prst="rect">
@@ -29040,93 +29040,6 @@
             <a:r>
               <a:rPr lang="it-IT" dirty="0" err="1"/>
               <a:t>PostMan</a:t>
-            </a:r>
-            <a:endParaRPr lang="it-IT" dirty="0"/>
-          </a:p>
-        </p:txBody>
-      </p:sp>
-      <p:cxnSp>
-        <p:nvCxnSpPr>
-          <p:cNvPr id="47" name="Straight Arrow Connector 46">
-            <a:extLst>
-              <a:ext uri="{FF2B5EF4-FFF2-40B4-BE49-F238E27FC236}">
-                <a16:creationId xmlns:a16="http://schemas.microsoft.com/office/drawing/2014/main" id="{A86EDE2E-5B75-4373-A6BD-8D9F7763B775}"/>
-              </a:ext>
-            </a:extLst>
-          </p:cNvPr>
-          <p:cNvCxnSpPr>
-            <a:cxnSpLocks/>
-            <a:endCxn id="49" idx="1"/>
-          </p:cNvCxnSpPr>
-          <p:nvPr/>
-        </p:nvCxnSpPr>
-        <p:spPr>
-          <a:xfrm flipV="1">
-            <a:off x="4446495" y="2924111"/>
-            <a:ext cx="2130251" cy="874684"/>
-          </a:xfrm>
-          <a:prstGeom prst="straightConnector1">
-            <a:avLst/>
-          </a:prstGeom>
-          <a:ln>
-            <a:tailEnd type="triangle"/>
-          </a:ln>
-        </p:spPr>
-        <p:style>
-          <a:lnRef idx="1">
-            <a:schemeClr val="accent1"/>
-          </a:lnRef>
-          <a:fillRef idx="0">
-            <a:schemeClr val="accent1"/>
-          </a:fillRef>
-          <a:effectRef idx="0">
-            <a:schemeClr val="accent1"/>
-          </a:effectRef>
-          <a:fontRef idx="minor">
-            <a:schemeClr val="tx1"/>
-          </a:fontRef>
-        </p:style>
-      </p:cxnSp>
-      <p:sp>
-        <p:nvSpPr>
-          <p:cNvPr id="49" name="TextBox 48">
-            <a:extLst>
-              <a:ext uri="{FF2B5EF4-FFF2-40B4-BE49-F238E27FC236}">
-                <a16:creationId xmlns:a16="http://schemas.microsoft.com/office/drawing/2014/main" id="{71CE29D2-99EF-4B9D-9B19-95829412C858}"/>
-              </a:ext>
-            </a:extLst>
-          </p:cNvPr>
-          <p:cNvSpPr txBox="1"/>
-          <p:nvPr/>
-        </p:nvSpPr>
-        <p:spPr>
-          <a:xfrm>
-            <a:off x="6576746" y="2739445"/>
-            <a:ext cx="1476001" cy="369332"/>
-          </a:xfrm>
-          <a:prstGeom prst="rect">
-            <a:avLst/>
-          </a:prstGeom>
-          <a:noFill/>
-          <a:ln w="19050">
-            <a:solidFill>
-              <a:schemeClr val="tx1"/>
-            </a:solidFill>
-          </a:ln>
-        </p:spPr>
-        <p:txBody>
-          <a:bodyPr wrap="square" rtlCol="0">
-            <a:spAutoFit/>
-          </a:bodyPr>
-          <a:lstStyle/>
-          <a:p>
-            <a:r>
-              <a:rPr lang="it-IT" dirty="0"/>
-              <a:t>IP/</a:t>
-            </a:r>
-            <a:r>
-              <a:rPr lang="it-IT" dirty="0" err="1"/>
-              <a:t>Actuator</a:t>
             </a:r>
             <a:endParaRPr lang="it-IT" dirty="0"/>
           </a:p>

</xml_diff>